<commit_message>
更新 MOindex.html 和 MOMOHAIRSTYLE2.0.pptx
</commit_message>
<xml_diff>
--- a/uploads/MOMOHAIRSTYLE2.0.pptx
+++ b/uploads/MOMOHAIRSTYLE2.0.pptx
@@ -105,6 +105,11 @@
       </a:defRPr>
     </a:lvl9pPr>
   </p:defaultTextStyle>
+  <p:extLst>
+    <p:ext uri="{EFAFB233-063F-42B5-8137-9DF3F51BA10A}">
+      <p15:sldGuideLst xmlns:p15="http://schemas.microsoft.com/office/powerpoint/2012/main"/>
+    </p:ext>
+  </p:extLst>
 </p:presentation>
 </file>
 
@@ -255,7 +260,7 @@
           <a:p>
             <a:fld id="{09A81EC2-38A6-CD47-B590-C2822F53E89B}" type="datetimeFigureOut">
               <a:rPr kumimoji="1" lang="zh-TW" altLang="en-US" smtClean="0"/>
-              <a:t>2026/1/23</a:t>
+              <a:t>2026/1/28</a:t>
             </a:fld>
             <a:endParaRPr kumimoji="1" lang="zh-TW" altLang="en-US"/>
           </a:p>
@@ -453,7 +458,7 @@
           <a:p>
             <a:fld id="{09A81EC2-38A6-CD47-B590-C2822F53E89B}" type="datetimeFigureOut">
               <a:rPr kumimoji="1" lang="zh-TW" altLang="en-US" smtClean="0"/>
-              <a:t>2026/1/23</a:t>
+              <a:t>2026/1/28</a:t>
             </a:fld>
             <a:endParaRPr kumimoji="1" lang="zh-TW" altLang="en-US"/>
           </a:p>
@@ -661,7 +666,7 @@
           <a:p>
             <a:fld id="{09A81EC2-38A6-CD47-B590-C2822F53E89B}" type="datetimeFigureOut">
               <a:rPr kumimoji="1" lang="zh-TW" altLang="en-US" smtClean="0"/>
-              <a:t>2026/1/23</a:t>
+              <a:t>2026/1/28</a:t>
             </a:fld>
             <a:endParaRPr kumimoji="1" lang="zh-TW" altLang="en-US"/>
           </a:p>
@@ -859,7 +864,7 @@
           <a:p>
             <a:fld id="{09A81EC2-38A6-CD47-B590-C2822F53E89B}" type="datetimeFigureOut">
               <a:rPr kumimoji="1" lang="zh-TW" altLang="en-US" smtClean="0"/>
-              <a:t>2026/1/23</a:t>
+              <a:t>2026/1/28</a:t>
             </a:fld>
             <a:endParaRPr kumimoji="1" lang="zh-TW" altLang="en-US"/>
           </a:p>
@@ -1134,7 +1139,7 @@
           <a:p>
             <a:fld id="{09A81EC2-38A6-CD47-B590-C2822F53E89B}" type="datetimeFigureOut">
               <a:rPr kumimoji="1" lang="zh-TW" altLang="en-US" smtClean="0"/>
-              <a:t>2026/1/23</a:t>
+              <a:t>2026/1/28</a:t>
             </a:fld>
             <a:endParaRPr kumimoji="1" lang="zh-TW" altLang="en-US"/>
           </a:p>
@@ -1399,7 +1404,7 @@
           <a:p>
             <a:fld id="{09A81EC2-38A6-CD47-B590-C2822F53E89B}" type="datetimeFigureOut">
               <a:rPr kumimoji="1" lang="zh-TW" altLang="en-US" smtClean="0"/>
-              <a:t>2026/1/23</a:t>
+              <a:t>2026/1/28</a:t>
             </a:fld>
             <a:endParaRPr kumimoji="1" lang="zh-TW" altLang="en-US"/>
           </a:p>
@@ -1811,7 +1816,7 @@
           <a:p>
             <a:fld id="{09A81EC2-38A6-CD47-B590-C2822F53E89B}" type="datetimeFigureOut">
               <a:rPr kumimoji="1" lang="zh-TW" altLang="en-US" smtClean="0"/>
-              <a:t>2026/1/23</a:t>
+              <a:t>2026/1/28</a:t>
             </a:fld>
             <a:endParaRPr kumimoji="1" lang="zh-TW" altLang="en-US"/>
           </a:p>
@@ -1952,7 +1957,7 @@
           <a:p>
             <a:fld id="{09A81EC2-38A6-CD47-B590-C2822F53E89B}" type="datetimeFigureOut">
               <a:rPr kumimoji="1" lang="zh-TW" altLang="en-US" smtClean="0"/>
-              <a:t>2026/1/23</a:t>
+              <a:t>2026/1/28</a:t>
             </a:fld>
             <a:endParaRPr kumimoji="1" lang="zh-TW" altLang="en-US"/>
           </a:p>
@@ -2065,7 +2070,7 @@
           <a:p>
             <a:fld id="{09A81EC2-38A6-CD47-B590-C2822F53E89B}" type="datetimeFigureOut">
               <a:rPr kumimoji="1" lang="zh-TW" altLang="en-US" smtClean="0"/>
-              <a:t>2026/1/23</a:t>
+              <a:t>2026/1/28</a:t>
             </a:fld>
             <a:endParaRPr kumimoji="1" lang="zh-TW" altLang="en-US"/>
           </a:p>
@@ -2376,7 +2381,7 @@
           <a:p>
             <a:fld id="{09A81EC2-38A6-CD47-B590-C2822F53E89B}" type="datetimeFigureOut">
               <a:rPr kumimoji="1" lang="zh-TW" altLang="en-US" smtClean="0"/>
-              <a:t>2026/1/23</a:t>
+              <a:t>2026/1/28</a:t>
             </a:fld>
             <a:endParaRPr kumimoji="1" lang="zh-TW" altLang="en-US"/>
           </a:p>
@@ -2664,7 +2669,7 @@
           <a:p>
             <a:fld id="{09A81EC2-38A6-CD47-B590-C2822F53E89B}" type="datetimeFigureOut">
               <a:rPr kumimoji="1" lang="zh-TW" altLang="en-US" smtClean="0"/>
-              <a:t>2026/1/23</a:t>
+              <a:t>2026/1/28</a:t>
             </a:fld>
             <a:endParaRPr kumimoji="1" lang="zh-TW" altLang="en-US"/>
           </a:p>
@@ -2905,7 +2910,7 @@
           <a:p>
             <a:fld id="{09A81EC2-38A6-CD47-B590-C2822F53E89B}" type="datetimeFigureOut">
               <a:rPr kumimoji="1" lang="zh-TW" altLang="en-US" smtClean="0"/>
-              <a:t>2026/1/23</a:t>
+              <a:t>2026/1/28</a:t>
             </a:fld>
             <a:endParaRPr kumimoji="1" lang="zh-TW" altLang="en-US"/>
           </a:p>
@@ -4105,117 +4110,20 @@
       </p:sp>
       <p:sp>
         <p:nvSpPr>
-          <p:cNvPr id="2" name="標題 1">
-            <a:extLst>
-              <a:ext uri="{FF2B5EF4-FFF2-40B4-BE49-F238E27FC236}">
-                <a16:creationId xmlns:a16="http://schemas.microsoft.com/office/drawing/2014/main" id="{AC531B7C-4FED-1688-B362-CF3863F48D67}"/>
-              </a:ext>
-            </a:extLst>
-          </p:cNvPr>
-          <p:cNvSpPr>
-            <a:spLocks noGrp="1"/>
-          </p:cNvSpPr>
-          <p:nvPr>
-            <p:ph type="ctrTitle"/>
-          </p:nvPr>
+          <p:cNvPr id="7" name="文字方塊 6">
+            <a:extLst>
+              <a:ext uri="{FF2B5EF4-FFF2-40B4-BE49-F238E27FC236}">
+                <a16:creationId xmlns:a16="http://schemas.microsoft.com/office/drawing/2014/main" id="{F053BAB4-BE2E-F0D2-24C5-AEBBB839786B}"/>
+              </a:ext>
+            </a:extLst>
+          </p:cNvPr>
+          <p:cNvSpPr txBox="1"/>
+          <p:nvPr/>
         </p:nvSpPr>
         <p:spPr>
           <a:xfrm>
-            <a:off x="5181600" y="1563457"/>
-            <a:ext cx="6068290" cy="2013671"/>
-          </a:xfrm>
-        </p:spPr>
-        <p:txBody>
-          <a:bodyPr anchor="ctr">
-            <a:noAutofit/>
-          </a:bodyPr>
-          <a:lstStyle/>
-          <a:p>
-            <a:pPr algn="r"/>
-            <a:r>
-              <a:rPr kumimoji="1" lang="en-US" altLang="zh-TW" sz="14000" b="1" dirty="0">
-                <a:latin typeface=""/>
-                <a:ea typeface="Hannotate TC" panose="03000500000000000000" pitchFamily="66" charset="-120"/>
-              </a:rPr>
-              <a:t>STYLE</a:t>
-            </a:r>
-            <a:endParaRPr kumimoji="1" lang="zh-TW" altLang="en-US" sz="14000" b="1" dirty="0">
-              <a:latin typeface=""/>
-              <a:ea typeface="Hannotate TC" panose="03000500000000000000" pitchFamily="66" charset="-120"/>
-            </a:endParaRPr>
-          </a:p>
-        </p:txBody>
-      </p:sp>
-      <p:sp>
-        <p:nvSpPr>
-          <p:cNvPr id="5" name="文字方塊 4">
-            <a:extLst>
-              <a:ext uri="{FF2B5EF4-FFF2-40B4-BE49-F238E27FC236}">
-                <a16:creationId xmlns:a16="http://schemas.microsoft.com/office/drawing/2014/main" id="{9C13B24A-0166-B514-6C96-5B6808F56423}"/>
-              </a:ext>
-            </a:extLst>
-          </p:cNvPr>
-          <p:cNvSpPr txBox="1"/>
-          <p:nvPr/>
-        </p:nvSpPr>
-        <p:spPr>
-          <a:xfrm>
-            <a:off x="6664035" y="3593638"/>
-            <a:ext cx="4585855" cy="1729356"/>
-          </a:xfrm>
-          <a:prstGeom prst="rect">
-            <a:avLst/>
-          </a:prstGeom>
-        </p:spPr>
-        <p:txBody>
-          <a:bodyPr vert="horz" lIns="91440" tIns="45720" rIns="91440" bIns="45720" rtlCol="0" anchor="ctr">
-            <a:noAutofit/>
-          </a:bodyPr>
-          <a:lstStyle>
-            <a:defPPr>
-              <a:defRPr lang="zh-TW"/>
-            </a:defPPr>
-            <a:lvl1pPr algn="ctr">
-              <a:lnSpc>
-                <a:spcPct val="90000"/>
-              </a:lnSpc>
-              <a:spcBef>
-                <a:spcPct val="0"/>
-              </a:spcBef>
-              <a:buNone/>
-              <a:defRPr kumimoji="1" sz="14000" b="1">
-                <a:latin typeface=""/>
-                <a:ea typeface="Hannotate TC" panose="03000500000000000000" pitchFamily="66" charset="-120"/>
-                <a:cs typeface="+mj-cs"/>
-              </a:defRPr>
-            </a:lvl1pPr>
-          </a:lstStyle>
-          <a:p>
-            <a:pPr algn="r"/>
-            <a:r>
-              <a:rPr lang="en-US" altLang="zh-TW" dirty="0"/>
-              <a:t>MO</a:t>
-            </a:r>
-            <a:endParaRPr lang="zh-TW" altLang="en-US" dirty="0"/>
-          </a:p>
-        </p:txBody>
-      </p:sp>
-      <p:sp>
-        <p:nvSpPr>
-          <p:cNvPr id="7" name="文字方塊 6">
-            <a:extLst>
-              <a:ext uri="{FF2B5EF4-FFF2-40B4-BE49-F238E27FC236}">
-                <a16:creationId xmlns:a16="http://schemas.microsoft.com/office/drawing/2014/main" id="{F053BAB4-BE2E-F0D2-24C5-AEBBB839786B}"/>
-              </a:ext>
-            </a:extLst>
-          </p:cNvPr>
-          <p:cNvSpPr txBox="1"/>
-          <p:nvPr/>
-        </p:nvSpPr>
-        <p:spPr>
-          <a:xfrm>
-            <a:off x="1413163" y="3593638"/>
-            <a:ext cx="4710545" cy="1729355"/>
+            <a:off x="584894" y="3569760"/>
+            <a:ext cx="10661927" cy="1729355"/>
           </a:xfrm>
           <a:prstGeom prst="rect">
             <a:avLst/>
@@ -4245,7 +4153,7 @@
             <a:pPr algn="l"/>
             <a:r>
               <a:rPr lang="en-US" altLang="zh-TW" sz="14000" dirty="0"/>
-              <a:t>HAIR</a:t>
+              <a:t>HAIRSTYLE</a:t>
             </a:r>
             <a:endParaRPr lang="zh-TW" altLang="en-US" sz="14000" dirty="0"/>
           </a:p>
@@ -4265,8 +4173,8 @@
         </p:nvSpPr>
         <p:spPr>
           <a:xfrm>
-            <a:off x="1413163" y="1699644"/>
-            <a:ext cx="3089564" cy="1729356"/>
+            <a:off x="555610" y="1675766"/>
+            <a:ext cx="6120706" cy="1729356"/>
           </a:xfrm>
           <a:prstGeom prst="rect">
             <a:avLst/>
@@ -4296,7 +4204,7 @@
             <a:pPr algn="l"/>
             <a:r>
               <a:rPr lang="en-US" altLang="zh-TW" sz="14000" dirty="0"/>
-              <a:t>MO </a:t>
+              <a:t>MORE </a:t>
             </a:r>
             <a:endParaRPr lang="zh-TW" altLang="en-US" sz="14000" dirty="0"/>
           </a:p>

</xml_diff>